<commit_message>
fixed typos in lec01 ppt, added note in REFERENCES
</commit_message>
<xml_diff>
--- a/LEC/lec01-intro-github-latex/intro-github-latex.pptx
+++ b/LEC/lec01-intro-github-latex/intro-github-latex.pptx
@@ -203,7 +203,7 @@
   <pc:docChgLst>
     <pc:chgData name="Frommer, Ian Dr. (EDU)" userId="28ca3ff0-544f-450a-928b-99e19cf49b89" providerId="ADAL" clId="{FDDA6EB0-4FD6-4516-ACA5-A4CAC6441DA7}"/>
     <pc:docChg chg="undo redo custSel addSld delSld modSld sldOrd">
-      <pc:chgData name="Frommer, Ian Dr. (EDU)" userId="28ca3ff0-544f-450a-928b-99e19cf49b89" providerId="ADAL" clId="{FDDA6EB0-4FD6-4516-ACA5-A4CAC6441DA7}" dt="2026-01-14T15:52:11.760" v="4991" actId="20577"/>
+      <pc:chgData name="Frommer, Ian Dr. (EDU)" userId="28ca3ff0-544f-450a-928b-99e19cf49b89" providerId="ADAL" clId="{FDDA6EB0-4FD6-4516-ACA5-A4CAC6441DA7}" dt="2026-01-14T19:32:37.516" v="4999" actId="20577"/>
       <pc:docMkLst>
         <pc:docMk/>
       </pc:docMkLst>
@@ -498,7 +498,7 @@
         </pc:picChg>
       </pc:sldChg>
       <pc:sldChg chg="addSp modSp add mod ord">
-        <pc:chgData name="Frommer, Ian Dr. (EDU)" userId="28ca3ff0-544f-450a-928b-99e19cf49b89" providerId="ADAL" clId="{FDDA6EB0-4FD6-4516-ACA5-A4CAC6441DA7}" dt="2026-01-14T14:25:35.576" v="3204" actId="20577"/>
+        <pc:chgData name="Frommer, Ian Dr. (EDU)" userId="28ca3ff0-544f-450a-928b-99e19cf49b89" providerId="ADAL" clId="{FDDA6EB0-4FD6-4516-ACA5-A4CAC6441DA7}" dt="2026-01-14T19:32:37.516" v="4999" actId="20577"/>
         <pc:sldMkLst>
           <pc:docMk/>
           <pc:sldMk cId="3348359454" sldId="279"/>
@@ -520,7 +520,7 @@
           </ac:spMkLst>
         </pc:spChg>
         <pc:graphicFrameChg chg="add mod modGraphic">
-          <ac:chgData name="Frommer, Ian Dr. (EDU)" userId="28ca3ff0-544f-450a-928b-99e19cf49b89" providerId="ADAL" clId="{FDDA6EB0-4FD6-4516-ACA5-A4CAC6441DA7}" dt="2026-01-14T14:25:35.576" v="3204" actId="20577"/>
+          <ac:chgData name="Frommer, Ian Dr. (EDU)" userId="28ca3ff0-544f-450a-928b-99e19cf49b89" providerId="ADAL" clId="{FDDA6EB0-4FD6-4516-ACA5-A4CAC6441DA7}" dt="2026-01-14T19:32:37.516" v="4999" actId="20577"/>
           <ac:graphicFrameMkLst>
             <pc:docMk/>
             <pc:sldMk cId="3348359454" sldId="279"/>
@@ -895,7 +895,7 @@
           <a:p>
             <a:fld id="{3173FC11-597C-40AB-A92D-AE8B47CBDCED}" type="datetimeFigureOut">
               <a:rPr lang="en-US" smtClean="0"/>
-              <a:t>1/13/2026</a:t>
+              <a:t>1/14/2026</a:t>
             </a:fld>
             <a:endParaRPr lang="en-US"/>
           </a:p>
@@ -1093,7 +1093,7 @@
           <a:p>
             <a:fld id="{3173FC11-597C-40AB-A92D-AE8B47CBDCED}" type="datetimeFigureOut">
               <a:rPr lang="en-US" smtClean="0"/>
-              <a:t>1/13/2026</a:t>
+              <a:t>1/14/2026</a:t>
             </a:fld>
             <a:endParaRPr lang="en-US"/>
           </a:p>
@@ -1301,7 +1301,7 @@
           <a:p>
             <a:fld id="{3173FC11-597C-40AB-A92D-AE8B47CBDCED}" type="datetimeFigureOut">
               <a:rPr lang="en-US" smtClean="0"/>
-              <a:t>1/13/2026</a:t>
+              <a:t>1/14/2026</a:t>
             </a:fld>
             <a:endParaRPr lang="en-US"/>
           </a:p>
@@ -1499,7 +1499,7 @@
           <a:p>
             <a:fld id="{3173FC11-597C-40AB-A92D-AE8B47CBDCED}" type="datetimeFigureOut">
               <a:rPr lang="en-US" smtClean="0"/>
-              <a:t>1/13/2026</a:t>
+              <a:t>1/14/2026</a:t>
             </a:fld>
             <a:endParaRPr lang="en-US"/>
           </a:p>
@@ -1774,7 +1774,7 @@
           <a:p>
             <a:fld id="{3173FC11-597C-40AB-A92D-AE8B47CBDCED}" type="datetimeFigureOut">
               <a:rPr lang="en-US" smtClean="0"/>
-              <a:t>1/13/2026</a:t>
+              <a:t>1/14/2026</a:t>
             </a:fld>
             <a:endParaRPr lang="en-US"/>
           </a:p>
@@ -2039,7 +2039,7 @@
           <a:p>
             <a:fld id="{3173FC11-597C-40AB-A92D-AE8B47CBDCED}" type="datetimeFigureOut">
               <a:rPr lang="en-US" smtClean="0"/>
-              <a:t>1/13/2026</a:t>
+              <a:t>1/14/2026</a:t>
             </a:fld>
             <a:endParaRPr lang="en-US"/>
           </a:p>
@@ -2451,7 +2451,7 @@
           <a:p>
             <a:fld id="{3173FC11-597C-40AB-A92D-AE8B47CBDCED}" type="datetimeFigureOut">
               <a:rPr lang="en-US" smtClean="0"/>
-              <a:t>1/13/2026</a:t>
+              <a:t>1/14/2026</a:t>
             </a:fld>
             <a:endParaRPr lang="en-US"/>
           </a:p>
@@ -2592,7 +2592,7 @@
           <a:p>
             <a:fld id="{3173FC11-597C-40AB-A92D-AE8B47CBDCED}" type="datetimeFigureOut">
               <a:rPr lang="en-US" smtClean="0"/>
-              <a:t>1/13/2026</a:t>
+              <a:t>1/14/2026</a:t>
             </a:fld>
             <a:endParaRPr lang="en-US"/>
           </a:p>
@@ -2705,7 +2705,7 @@
           <a:p>
             <a:fld id="{3173FC11-597C-40AB-A92D-AE8B47CBDCED}" type="datetimeFigureOut">
               <a:rPr lang="en-US" smtClean="0"/>
-              <a:t>1/13/2026</a:t>
+              <a:t>1/14/2026</a:t>
             </a:fld>
             <a:endParaRPr lang="en-US"/>
           </a:p>
@@ -3016,7 +3016,7 @@
           <a:p>
             <a:fld id="{3173FC11-597C-40AB-A92D-AE8B47CBDCED}" type="datetimeFigureOut">
               <a:rPr lang="en-US" smtClean="0"/>
-              <a:t>1/13/2026</a:t>
+              <a:t>1/14/2026</a:t>
             </a:fld>
             <a:endParaRPr lang="en-US"/>
           </a:p>
@@ -3304,7 +3304,7 @@
           <a:p>
             <a:fld id="{3173FC11-597C-40AB-A92D-AE8B47CBDCED}" type="datetimeFigureOut">
               <a:rPr lang="en-US" smtClean="0"/>
-              <a:t>1/13/2026</a:t>
+              <a:t>1/14/2026</a:t>
             </a:fld>
             <a:endParaRPr lang="en-US"/>
           </a:p>
@@ -3545,7 +3545,7 @@
           <a:p>
             <a:fld id="{3173FC11-597C-40AB-A92D-AE8B47CBDCED}" type="datetimeFigureOut">
               <a:rPr lang="en-US" smtClean="0"/>
-              <a:t>1/13/2026</a:t>
+              <a:t>1/14/2026</a:t>
             </a:fld>
             <a:endParaRPr lang="en-US"/>
           </a:p>
@@ -6892,7 +6892,7 @@
           <p:nvPr>
             <p:extLst>
               <p:ext uri="{D42A27DB-BD31-4B8C-83A1-F6EECF244321}">
-                <p14:modId xmlns:p14="http://schemas.microsoft.com/office/powerpoint/2010/main" val="2497223716"/>
+                <p14:modId xmlns:p14="http://schemas.microsoft.com/office/powerpoint/2010/main" val="636521457"/>
               </p:ext>
             </p:extLst>
           </p:nvPr>
@@ -6952,7 +6952,7 @@
                           <a:latin typeface="Times New Roman" panose="02020603050405020304" pitchFamily="18" charset="0"/>
                           <a:cs typeface="Times New Roman" panose="02020603050405020304" pitchFamily="18" charset="0"/>
                         </a:rPr>
-                        <a:t> B-H in github basics_A</a:t>
+                        <a:t> B-H in github_basics_A</a:t>
                       </a:r>
                     </a:p>
                     <a:p>
@@ -6965,7 +6965,7 @@
                           <a:latin typeface="Times New Roman" panose="02020603050405020304" pitchFamily="18" charset="0"/>
                           <a:cs typeface="Times New Roman" panose="02020603050405020304" pitchFamily="18" charset="0"/>
                         </a:rPr>
-                        <a:t> J-P in github basics_B</a:t>
+                        <a:t> J-P in github_basics_B</a:t>
                       </a:r>
                     </a:p>
                     <a:p>
@@ -6978,7 +6978,7 @@
                           <a:latin typeface="Times New Roman" panose="02020603050405020304" pitchFamily="18" charset="0"/>
                           <a:cs typeface="Times New Roman" panose="02020603050405020304" pitchFamily="18" charset="0"/>
                         </a:rPr>
-                        <a:t> R-W in github basics_C</a:t>
+                        <a:t> R-W in github_basics_C</a:t>
                       </a:r>
                     </a:p>
                     <a:p>
@@ -6990,7 +6990,7 @@
                           <a:latin typeface="Times New Roman" panose="02020603050405020304" pitchFamily="18" charset="0"/>
                           <a:cs typeface="Times New Roman" panose="02020603050405020304" pitchFamily="18" charset="0"/>
                         </a:rPr>
-                        <a:t>Following the script demonstrated in class, make changes to the repo rst by taking turns and then overlapping. When overlapping, resolve the conict and merge the changes. Write up a brief recap of these activities as your answer to this question.</a:t>
+                        <a:t>Following the script demonstrated in class, make changes to the repo rst by taking turns and then overlapping. When overlapping, resolve the conflict and merge the changes. Write up a brief recap of these activities as your answer to this question.</a:t>
                       </a:r>
                     </a:p>
                     <a:p>

</xml_diff>